<commit_message>
accept all and ready to submit
</commit_message>
<xml_diff>
--- a/figures/Figure2.pptx
+++ b/figures/Figure2.pptx
@@ -3428,7 +3428,7 @@
           <p:nvPr>
             <p:extLst>
               <p:ext uri="{D42A27DB-BD31-4B8C-83A1-F6EECF244321}">
-                <p14:modId xmlns:p14="http://schemas.microsoft.com/office/powerpoint/2010/main" val="4142591302"/>
+                <p14:modId xmlns:p14="http://schemas.microsoft.com/office/powerpoint/2010/main" val="209433629"/>
               </p:ext>
             </p:extLst>
           </p:nvPr>
@@ -5810,14 +5810,14 @@
                           <a:latin typeface="+mn-lt"/>
                           <a:cs typeface="Times New Roman" panose="02020603050405020304" pitchFamily="18" charset="0"/>
                         </a:rPr>
-                        <a:t>A segment (“rod”) enclosed in a tilted square ('frame’), </a:t>
+                        <a:t>A segment (“rod”) enclosed in a tilted </a:t>
                       </a:r>
                       <a:r>
                         <a:rPr lang="en-US" sz="2400">
                           <a:latin typeface="+mn-lt"/>
                           <a:cs typeface="Times New Roman" panose="02020603050405020304" pitchFamily="18" charset="0"/>
                         </a:rPr>
-                        <a:t>that appears </a:t>
+                        <a:t>square (“frame”), that appears </a:t>
                       </a:r>
                       <a:r>
                         <a:rPr lang="en-US" sz="2400" dirty="0">
@@ -6794,7 +6794,7 @@
                           <a:latin typeface="+mn-lt"/>
                           <a:cs typeface="Times New Roman" panose="02020603050405020304" pitchFamily="18" charset="0"/>
                         </a:rPr>
-                        <a:t>Composed of a series of contrasting horizontal bars superimposed with vertical grey rectangles. Rectangles superimposed onto darker bars appear lighter</a:t>
+                        <a:t>Composed of a series of contrasting horizontal bars superimposed with vertical grey rectangles. Rectangles superimposed onto darker bars appear lighter.</a:t>
                       </a:r>
                       <a:endParaRPr lang="en-SG" sz="2400" dirty="0">
                         <a:latin typeface="+mn-lt"/>

</xml_diff>